<commit_message>
bugfix for SNP matrix script.
</commit_message>
<xml_diff>
--- a/Summary/20210201_demo_for_ccgb_rotation_update.pptx
+++ b/Summary/20210201_demo_for_ccgb_rotation_update.pptx
@@ -222,7 +222,7 @@
           <a:p>
             <a:fld id="{2F446724-7A58-4020-9182-8374F0305DD3}" type="datetimeFigureOut">
               <a:rPr lang="en-US" smtClean="0"/>
-              <a:t>2/1/2021</a:t>
+              <a:t>2/9/2021</a:t>
             </a:fld>
             <a:endParaRPr lang="en-US"/>
           </a:p>
@@ -888,7 +888,7 @@
           <a:p>
             <a:fld id="{6A6E4237-9E27-40CF-A4D8-1330F92F21DA}" type="datetimeFigureOut">
               <a:rPr lang="en-US" smtClean="0"/>
-              <a:t>2/1/2021</a:t>
+              <a:t>2/9/2021</a:t>
             </a:fld>
             <a:endParaRPr lang="en-US"/>
           </a:p>
@@ -1086,7 +1086,7 @@
           <a:p>
             <a:fld id="{6A6E4237-9E27-40CF-A4D8-1330F92F21DA}" type="datetimeFigureOut">
               <a:rPr lang="en-US" smtClean="0"/>
-              <a:t>2/1/2021</a:t>
+              <a:t>2/9/2021</a:t>
             </a:fld>
             <a:endParaRPr lang="en-US"/>
           </a:p>
@@ -1294,7 +1294,7 @@
           <a:p>
             <a:fld id="{6A6E4237-9E27-40CF-A4D8-1330F92F21DA}" type="datetimeFigureOut">
               <a:rPr lang="en-US" smtClean="0"/>
-              <a:t>2/1/2021</a:t>
+              <a:t>2/9/2021</a:t>
             </a:fld>
             <a:endParaRPr lang="en-US"/>
           </a:p>
@@ -1492,7 +1492,7 @@
           <a:p>
             <a:fld id="{6A6E4237-9E27-40CF-A4D8-1330F92F21DA}" type="datetimeFigureOut">
               <a:rPr lang="en-US" smtClean="0"/>
-              <a:t>2/1/2021</a:t>
+              <a:t>2/9/2021</a:t>
             </a:fld>
             <a:endParaRPr lang="en-US"/>
           </a:p>
@@ -1767,7 +1767,7 @@
           <a:p>
             <a:fld id="{6A6E4237-9E27-40CF-A4D8-1330F92F21DA}" type="datetimeFigureOut">
               <a:rPr lang="en-US" smtClean="0"/>
-              <a:t>2/1/2021</a:t>
+              <a:t>2/9/2021</a:t>
             </a:fld>
             <a:endParaRPr lang="en-US"/>
           </a:p>
@@ -2032,7 +2032,7 @@
           <a:p>
             <a:fld id="{6A6E4237-9E27-40CF-A4D8-1330F92F21DA}" type="datetimeFigureOut">
               <a:rPr lang="en-US" smtClean="0"/>
-              <a:t>2/1/2021</a:t>
+              <a:t>2/9/2021</a:t>
             </a:fld>
             <a:endParaRPr lang="en-US"/>
           </a:p>
@@ -2444,7 +2444,7 @@
           <a:p>
             <a:fld id="{6A6E4237-9E27-40CF-A4D8-1330F92F21DA}" type="datetimeFigureOut">
               <a:rPr lang="en-US" smtClean="0"/>
-              <a:t>2/1/2021</a:t>
+              <a:t>2/9/2021</a:t>
             </a:fld>
             <a:endParaRPr lang="en-US"/>
           </a:p>
@@ -2585,7 +2585,7 @@
           <a:p>
             <a:fld id="{6A6E4237-9E27-40CF-A4D8-1330F92F21DA}" type="datetimeFigureOut">
               <a:rPr lang="en-US" smtClean="0"/>
-              <a:t>2/1/2021</a:t>
+              <a:t>2/9/2021</a:t>
             </a:fld>
             <a:endParaRPr lang="en-US"/>
           </a:p>
@@ -2698,7 +2698,7 @@
           <a:p>
             <a:fld id="{6A6E4237-9E27-40CF-A4D8-1330F92F21DA}" type="datetimeFigureOut">
               <a:rPr lang="en-US" smtClean="0"/>
-              <a:t>2/1/2021</a:t>
+              <a:t>2/9/2021</a:t>
             </a:fld>
             <a:endParaRPr lang="en-US"/>
           </a:p>
@@ -3009,7 +3009,7 @@
           <a:p>
             <a:fld id="{6A6E4237-9E27-40CF-A4D8-1330F92F21DA}" type="datetimeFigureOut">
               <a:rPr lang="en-US" smtClean="0"/>
-              <a:t>2/1/2021</a:t>
+              <a:t>2/9/2021</a:t>
             </a:fld>
             <a:endParaRPr lang="en-US"/>
           </a:p>
@@ -3297,7 +3297,7 @@
           <a:p>
             <a:fld id="{6A6E4237-9E27-40CF-A4D8-1330F92F21DA}" type="datetimeFigureOut">
               <a:rPr lang="en-US" smtClean="0"/>
-              <a:t>2/1/2021</a:t>
+              <a:t>2/9/2021</a:t>
             </a:fld>
             <a:endParaRPr lang="en-US"/>
           </a:p>
@@ -3538,7 +3538,7 @@
           <a:p>
             <a:fld id="{6A6E4237-9E27-40CF-A4D8-1330F92F21DA}" type="datetimeFigureOut">
               <a:rPr lang="en-US" smtClean="0"/>
-              <a:t>2/1/2021</a:t>
+              <a:t>2/9/2021</a:t>
             </a:fld>
             <a:endParaRPr lang="en-US"/>
           </a:p>

</xml_diff>